<commit_message>
notification that ppl can message during duel
</commit_message>
<xml_diff>
--- a/img/commands.pptx
+++ b/img/commands.pptx
@@ -244,7 +244,7 @@
           <a:p>
             <a:fld id="{3A5172DC-B898-0C4F-AEAC-152C0735B4A5}" type="datetimeFigureOut">
               <a:rPr lang="en-US" smtClean="0"/>
-              <a:t>5/25/16</a:t>
+              <a:t>5/27/16</a:t>
             </a:fld>
             <a:endParaRPr lang="en-US"/>
           </a:p>
@@ -414,7 +414,7 @@
           <a:p>
             <a:fld id="{3A5172DC-B898-0C4F-AEAC-152C0735B4A5}" type="datetimeFigureOut">
               <a:rPr lang="en-US" smtClean="0"/>
-              <a:t>5/25/16</a:t>
+              <a:t>5/27/16</a:t>
             </a:fld>
             <a:endParaRPr lang="en-US"/>
           </a:p>
@@ -594,7 +594,7 @@
           <a:p>
             <a:fld id="{3A5172DC-B898-0C4F-AEAC-152C0735B4A5}" type="datetimeFigureOut">
               <a:rPr lang="en-US" smtClean="0"/>
-              <a:t>5/25/16</a:t>
+              <a:t>5/27/16</a:t>
             </a:fld>
             <a:endParaRPr lang="en-US"/>
           </a:p>
@@ -764,7 +764,7 @@
           <a:p>
             <a:fld id="{3A5172DC-B898-0C4F-AEAC-152C0735B4A5}" type="datetimeFigureOut">
               <a:rPr lang="en-US" smtClean="0"/>
-              <a:t>5/25/16</a:t>
+              <a:t>5/27/16</a:t>
             </a:fld>
             <a:endParaRPr lang="en-US"/>
           </a:p>
@@ -1010,7 +1010,7 @@
           <a:p>
             <a:fld id="{3A5172DC-B898-0C4F-AEAC-152C0735B4A5}" type="datetimeFigureOut">
               <a:rPr lang="en-US" smtClean="0"/>
-              <a:t>5/25/16</a:t>
+              <a:t>5/27/16</a:t>
             </a:fld>
             <a:endParaRPr lang="en-US"/>
           </a:p>
@@ -1242,7 +1242,7 @@
           <a:p>
             <a:fld id="{3A5172DC-B898-0C4F-AEAC-152C0735B4A5}" type="datetimeFigureOut">
               <a:rPr lang="en-US" smtClean="0"/>
-              <a:t>5/25/16</a:t>
+              <a:t>5/27/16</a:t>
             </a:fld>
             <a:endParaRPr lang="en-US"/>
           </a:p>
@@ -1609,7 +1609,7 @@
           <a:p>
             <a:fld id="{3A5172DC-B898-0C4F-AEAC-152C0735B4A5}" type="datetimeFigureOut">
               <a:rPr lang="en-US" smtClean="0"/>
-              <a:t>5/25/16</a:t>
+              <a:t>5/27/16</a:t>
             </a:fld>
             <a:endParaRPr lang="en-US"/>
           </a:p>
@@ -1727,7 +1727,7 @@
           <a:p>
             <a:fld id="{3A5172DC-B898-0C4F-AEAC-152C0735B4A5}" type="datetimeFigureOut">
               <a:rPr lang="en-US" smtClean="0"/>
-              <a:t>5/25/16</a:t>
+              <a:t>5/27/16</a:t>
             </a:fld>
             <a:endParaRPr lang="en-US"/>
           </a:p>
@@ -1822,7 +1822,7 @@
           <a:p>
             <a:fld id="{3A5172DC-B898-0C4F-AEAC-152C0735B4A5}" type="datetimeFigureOut">
               <a:rPr lang="en-US" smtClean="0"/>
-              <a:t>5/25/16</a:t>
+              <a:t>5/27/16</a:t>
             </a:fld>
             <a:endParaRPr lang="en-US"/>
           </a:p>
@@ -2099,7 +2099,7 @@
           <a:p>
             <a:fld id="{3A5172DC-B898-0C4F-AEAC-152C0735B4A5}" type="datetimeFigureOut">
               <a:rPr lang="en-US" smtClean="0"/>
-              <a:t>5/25/16</a:t>
+              <a:t>5/27/16</a:t>
             </a:fld>
             <a:endParaRPr lang="en-US"/>
           </a:p>
@@ -2352,7 +2352,7 @@
           <a:p>
             <a:fld id="{3A5172DC-B898-0C4F-AEAC-152C0735B4A5}" type="datetimeFigureOut">
               <a:rPr lang="en-US" smtClean="0"/>
-              <a:t>5/25/16</a:t>
+              <a:t>5/27/16</a:t>
             </a:fld>
             <a:endParaRPr lang="en-US"/>
           </a:p>
@@ -2565,7 +2565,7 @@
           <a:p>
             <a:fld id="{3A5172DC-B898-0C4F-AEAC-152C0735B4A5}" type="datetimeFigureOut">
               <a:rPr lang="en-US" smtClean="0"/>
-              <a:t>5/25/16</a:t>
+              <a:t>5/27/16</a:t>
             </a:fld>
             <a:endParaRPr lang="en-US"/>
           </a:p>
@@ -3009,23 +3009,7 @@
                 <a:ea typeface="Helvetica" charset="0"/>
                 <a:cs typeface="Helvetica" charset="0"/>
               </a:rPr>
-              <a:t>🔎 GENERAL COMMANDS </a:t>
-            </a:r>
-            <a:r>
-              <a:rPr lang="en-US" dirty="0" smtClean="0">
-                <a:latin typeface="Helvetica" charset="0"/>
-                <a:ea typeface="Helvetica" charset="0"/>
-                <a:cs typeface="Helvetica" charset="0"/>
-              </a:rPr>
-              <a:t>🔎</a:t>
-            </a:r>
-            <a:r>
-              <a:rPr lang="en-US" dirty="0" smtClean="0">
-                <a:latin typeface="Helvetica" charset="0"/>
-                <a:ea typeface="Helvetica" charset="0"/>
-                <a:cs typeface="Helvetica" charset="0"/>
-              </a:rPr>
-              <a:t/>
+              <a:t>🔎 GENERAL COMMANDS 🔎</a:t>
             </a:r>
             <a:br>
               <a:rPr lang="en-US" dirty="0" smtClean="0">
@@ -3130,15 +3114,7 @@
                 <a:ea typeface="Helvetica" charset="0"/>
                 <a:cs typeface="Helvetica" charset="0"/>
               </a:rPr>
-              <a:t>⚪ @me: Displays your stats</a:t>
-            </a:r>
-            <a:r>
-              <a:rPr lang="en-US" dirty="0" smtClean="0">
-                <a:latin typeface="Helvetica" charset="0"/>
-                <a:ea typeface="Helvetica" charset="0"/>
-                <a:cs typeface="Helvetica" charset="0"/>
-              </a:rPr>
-              <a:t>.</a:t>
+              <a:t>⚪ @me: Displays your stats.</a:t>
             </a:r>
           </a:p>
           <a:p>
@@ -3222,7 +3198,7 @@
         <p:spPr>
           <a:xfrm>
             <a:off x="520699" y="327442"/>
-            <a:ext cx="6263559" cy="3139321"/>
+            <a:ext cx="6868243" cy="3416320"/>
           </a:xfrm>
           <a:prstGeom prst="rect">
             <a:avLst/>
@@ -3295,20 +3271,55 @@
           <a:p>
             <a:pPr marL="274320"/>
             <a:r>
-              <a:rPr lang="en-US" smtClean="0">
-                <a:latin typeface="Helvetica" charset="0"/>
-                <a:ea typeface="Helvetica" charset="0"/>
-                <a:cs typeface="Helvetica" charset="0"/>
-              </a:rPr>
-              <a:t>⚪ @</a:t>
-            </a:r>
-            <a:r>
               <a:rPr lang="en-US" dirty="0" smtClean="0">
                 <a:latin typeface="Helvetica" charset="0"/>
                 <a:ea typeface="Helvetica" charset="0"/>
                 <a:cs typeface="Helvetica" charset="0"/>
               </a:rPr>
-              <a:t>heal/@h: Heal yourself for 10 health. 3 per duel.</a:t>
+              <a:t>⚪ </a:t>
+            </a:r>
+            <a:r>
+              <a:rPr lang="en-US" dirty="0" smtClean="0">
+                <a:latin typeface="Helvetica" charset="0"/>
+                <a:ea typeface="Helvetica" charset="0"/>
+                <a:cs typeface="Helvetica" charset="0"/>
+              </a:rPr>
+              <a:t>@heal/@h: Heal yourself for 10 health. 3 per duel</a:t>
+            </a:r>
+            <a:r>
+              <a:rPr lang="en-US" dirty="0" smtClean="0">
+                <a:latin typeface="Helvetica" charset="0"/>
+                <a:ea typeface="Helvetica" charset="0"/>
+                <a:cs typeface="Helvetica" charset="0"/>
+              </a:rPr>
+              <a:t>.</a:t>
+            </a:r>
+          </a:p>
+          <a:p>
+            <a:pPr marL="274320"/>
+            <a:r>
+              <a:rPr lang="en-US" dirty="0">
+                <a:latin typeface="Helvetica" charset="0"/>
+                <a:ea typeface="Helvetica" charset="0"/>
+                <a:cs typeface="Helvetica" charset="0"/>
+              </a:rPr>
+              <a:t>⚪ </a:t>
+            </a:r>
+            <a:r>
+              <a:rPr lang="en-US" dirty="0" smtClean="0">
+                <a:latin typeface="Helvetica" charset="0"/>
+                <a:ea typeface="Helvetica" charset="0"/>
+                <a:cs typeface="Helvetica" charset="0"/>
+              </a:rPr>
+              <a:t>@pressure: Start a 30 second timer for your opponent to move, or else they lose.</a:t>
+            </a:r>
+            <a:r>
+              <a:rPr lang="en-US" dirty="0" smtClean="0">
+                <a:latin typeface="Helvetica" charset="0"/>
+                <a:ea typeface="Helvetica" charset="0"/>
+                <a:cs typeface="Helvetica" charset="0"/>
+              </a:rPr>
+              <a:t/>
             </a:r>
             <a:br>
               <a:rPr lang="en-US" dirty="0" smtClean="0">

</xml_diff>